<commit_message>
Run presentation on windows
</commit_message>
<xml_diff>
--- a/2023/postdoc_presentation/presentation.pptx
+++ b/2023/postdoc_presentation/presentation.pptx
@@ -4906,7 +4906,7 @@
             </a:pPr>
             <a:r>
               <a:rPr/>
-              <a:t>Applying for jobs</a:t>
+              <a:t>Applying for jobs – “Proactive Serendipity”</a:t>
             </a:r>
           </a:p>
         </p:txBody>
@@ -5453,7 +5453,7 @@
       </p:sp>
       <p:pic>
         <p:nvPicPr>
-          <p:cNvPr descr="presentation_files/figure-pptx/mermaid-figure-1.png" id="0" name="Picture 1"/>
+          <p:cNvPr descr="presentation_files\figure-pptx\mermaid-figure-1.png" id="0" name="Picture 1"/>
           <p:cNvPicPr>
             <a:picLocks noGrp="1" noChangeAspect="1"/>
           </p:cNvPicPr>
@@ -5467,8 +5467,8 @@
         </p:blipFill>
         <p:spPr bwMode="auto">
           <a:xfrm>
-            <a:off x="2006600" y="1193800"/>
-            <a:ext cx="5143500" cy="3390900"/>
+            <a:off x="2146300" y="1193800"/>
+            <a:ext cx="4864100" cy="3390900"/>
           </a:xfrm>
           <a:prstGeom prst="rect">
             <a:avLst/>
@@ -6105,7 +6105,7 @@
       </p:sp>
       <p:pic>
         <p:nvPicPr>
-          <p:cNvPr descr="fig:PhD Writing Process  http://www.phdcomics.com/comics/archive/phd072314s.gif" id="0" name="Picture 1"/>
+          <p:cNvPr descr="PhD Writing Process  http://www.phdcomics.com/comics/archive/phd072314s.gif" id="0" name="Picture 1"/>
           <p:cNvPicPr>
             <a:picLocks noGrp="1" noChangeAspect="1"/>
           </p:cNvPicPr>
@@ -6212,7 +6212,7 @@
       </p:sp>
       <p:pic>
         <p:nvPicPr>
-          <p:cNvPr descr="fig:PhD Writing Process  http://www.phdcomics.com/comics/archive/phd012903s.gif" id="0" name="Picture 1"/>
+          <p:cNvPr descr="PhD Writing Process  http://www.phdcomics.com/comics/archive/phd012903s.gif" id="0" name="Picture 1"/>
           <p:cNvPicPr>
             <a:picLocks noGrp="1" noChangeAspect="1"/>
           </p:cNvPicPr>

</xml_diff>